<commit_message>
Added Claas to the list of authors
</commit_message>
<xml_diff>
--- a/docs/source/component-model.pptx
+++ b/docs/source/component-model.pptx
@@ -186,7 +186,7 @@
           <a:p>
             <a:fld id="{681EF29B-F0DE-4A5D-971E-F0D2D074F34E}" type="datetime4">
               <a:rPr lang="en-GB" smtClean="0"/>
-              <a:t>10 November 2024</a:t>
+              <a:t>11 November 2024</a:t>
             </a:fld>
             <a:endParaRPr lang="en-GB" sz="800" dirty="0"/>
           </a:p>
@@ -1238,7 +1238,7 @@
           <a:p>
             <a:fld id="{681EF29B-F0DE-4A5D-971E-F0D2D074F34E}" type="datetime4">
               <a:rPr lang="en-GB" smtClean="0"/>
-              <a:t>10 November 2024</a:t>
+              <a:t>11 November 2024</a:t>
             </a:fld>
             <a:endParaRPr lang="en-GB" sz="800" dirty="0"/>
           </a:p>
@@ -8801,7 +8801,7 @@
             <a:fld id="{727BBD34-DD59-49E1-9776-D67684F06344}" type="datetime4">
               <a:rPr lang="en-GB" smtClean="0"/>
               <a:pPr/>
-              <a:t>10 November 2024</a:t>
+              <a:t>11 November 2024</a:t>
             </a:fld>
             <a:endParaRPr lang="en-GB" dirty="0"/>
           </a:p>
@@ -10094,7 +10094,7 @@
             <a:fld id="{727BBD34-DD59-49E1-9776-D67684F06344}" type="datetime4">
               <a:rPr lang="en-GB" smtClean="0"/>
               <a:pPr/>
-              <a:t>10 November 2024</a:t>
+              <a:t>11 November 2024</a:t>
             </a:fld>
             <a:endParaRPr lang="en-GB" dirty="0"/>
           </a:p>
@@ -25311,7 +25311,7 @@
           <a:p>
             <a:fld id="{6F52A3B9-C46E-47C2-A1FB-F5434525BDF4}" type="datetime4">
               <a:rPr lang="en-GB" smtClean="0"/>
-              <a:t>10 November 2024</a:t>
+              <a:t>11 November 2024</a:t>
             </a:fld>
             <a:endParaRPr lang="en-GB" dirty="0"/>
           </a:p>
@@ -38124,13 +38124,23 @@
             </a:r>
             <a:r>
               <a:rPr lang="en-GB" dirty="0"/>
-              <a:t> &amp; </a:t>
+              <a:t>, </a:t>
             </a:r>
             <a:r>
               <a:rPr lang="pt-BR" dirty="0">
                 <a:hlinkClick r:id="rId4"/>
               </a:rPr>
               <a:t>Jorge.Luis.Mendez@dnv.com</a:t>
+            </a:r>
+            <a:r>
+              <a:rPr lang="pt-BR" dirty="0"/>
+              <a:t> and </a:t>
+            </a:r>
+            <a:r>
+              <a:rPr lang="pt-BR" dirty="0">
+                <a:hlinkClick r:id="rId5"/>
+              </a:rPr>
+              <a:t>Claas.Rostock@DNV.com</a:t>
             </a:r>
             <a:endParaRPr lang="en-GB" dirty="0"/>
           </a:p>
@@ -42166,13 +42176,35 @@
             </a:r>
             <a:r>
               <a:rPr lang="en-GB" dirty="0"/>
-              <a:t> &amp; </a:t>
+              <a:t>, </a:t>
+            </a:r>
+            <a:r>
+              <a:rPr lang="pt-BR">
+                <a:hlinkClick r:id="rId4"/>
+              </a:rPr>
+              <a:t>Jorge</a:t>
             </a:r>
             <a:r>
               <a:rPr lang="pt-BR" dirty="0">
                 <a:hlinkClick r:id="rId4"/>
               </a:rPr>
-              <a:t>Jorge.Luis.Mendez@DNV.com</a:t>
+              <a:t>.Luis.Mendez@DNV</a:t>
+            </a:r>
+            <a:r>
+              <a:rPr lang="pt-BR">
+                <a:hlinkClick r:id="rId4"/>
+              </a:rPr>
+              <a:t>.com</a:t>
+            </a:r>
+            <a:r>
+              <a:rPr lang="pt-BR"/>
+              <a:t> and </a:t>
+            </a:r>
+            <a:r>
+              <a:rPr lang="pt-BR">
+                <a:hlinkClick r:id="rId5"/>
+              </a:rPr>
+              <a:t>Claas.Rostock@DNV.com</a:t>
             </a:r>
             <a:endParaRPr lang="pt-BR" dirty="0"/>
           </a:p>

</xml_diff>

<commit_message>
Added a sketch of new features for later inclusion in PythonFMU. Fixed a naming error in model.py
</commit_message>
<xml_diff>
--- a/docs/source/component-model.pptx
+++ b/docs/source/component-model.pptx
@@ -186,7 +186,7 @@
           <a:p>
             <a:fld id="{681EF29B-F0DE-4A5D-971E-F0D2D074F34E}" type="datetime4">
               <a:rPr lang="en-GB" smtClean="0"/>
-              <a:t>11 November 2024</a:t>
+              <a:t>19 November 2024</a:t>
             </a:fld>
             <a:endParaRPr lang="en-GB" sz="800" dirty="0"/>
           </a:p>
@@ -1238,7 +1238,7 @@
           <a:p>
             <a:fld id="{681EF29B-F0DE-4A5D-971E-F0D2D074F34E}" type="datetime4">
               <a:rPr lang="en-GB" smtClean="0"/>
-              <a:t>11 November 2024</a:t>
+              <a:t>19 November 2024</a:t>
             </a:fld>
             <a:endParaRPr lang="en-GB" sz="800" dirty="0"/>
           </a:p>
@@ -8801,7 +8801,7 @@
             <a:fld id="{727BBD34-DD59-49E1-9776-D67684F06344}" type="datetime4">
               <a:rPr lang="en-GB" smtClean="0"/>
               <a:pPr/>
-              <a:t>11 November 2024</a:t>
+              <a:t>19 November 2024</a:t>
             </a:fld>
             <a:endParaRPr lang="en-GB" dirty="0"/>
           </a:p>
@@ -10094,7 +10094,7 @@
             <a:fld id="{727BBD34-DD59-49E1-9776-D67684F06344}" type="datetime4">
               <a:rPr lang="en-GB" smtClean="0"/>
               <a:pPr/>
-              <a:t>11 November 2024</a:t>
+              <a:t>19 November 2024</a:t>
             </a:fld>
             <a:endParaRPr lang="en-GB" dirty="0"/>
           </a:p>
@@ -25311,7 +25311,7 @@
           <a:p>
             <a:fld id="{6F52A3B9-C46E-47C2-A1FB-F5434525BDF4}" type="datetime4">
               <a:rPr lang="en-GB" smtClean="0"/>
-              <a:t>11 November 2024</a:t>
+              <a:t>19 November 2024</a:t>
             </a:fld>
             <a:endParaRPr lang="en-GB" dirty="0"/>
           </a:p>
@@ -38220,7 +38220,7 @@
         </p:nvSpPr>
         <p:spPr>
           <a:xfrm>
-            <a:off x="3268216" y="3238085"/>
+            <a:off x="5231597" y="3041744"/>
             <a:ext cx="3942911" cy="1122934"/>
           </a:xfrm>
           <a:prstGeom prst="rect">
@@ -38283,7 +38283,7 @@
         </p:nvSpPr>
         <p:spPr>
           <a:xfrm>
-            <a:off x="3394703" y="4896433"/>
+            <a:off x="5358084" y="4700092"/>
             <a:ext cx="3744416" cy="720080"/>
           </a:xfrm>
           <a:prstGeom prst="rect">
@@ -38420,7 +38420,7 @@
         </p:nvSpPr>
         <p:spPr>
           <a:xfrm>
-            <a:off x="3538719" y="5184465"/>
+            <a:off x="5502100" y="4988124"/>
             <a:ext cx="1286177" cy="380480"/>
           </a:xfrm>
           <a:prstGeom prst="rect">
@@ -38472,7 +38472,7 @@
         </p:nvSpPr>
         <p:spPr>
           <a:xfrm>
-            <a:off x="5266911" y="5184465"/>
+            <a:off x="7230292" y="4988124"/>
             <a:ext cx="1723989" cy="380480"/>
           </a:xfrm>
           <a:prstGeom prst="rect">
@@ -38529,7 +38529,7 @@
         </p:nvSpPr>
         <p:spPr>
           <a:xfrm>
-            <a:off x="3394703" y="4896433"/>
+            <a:off x="5358084" y="4700092"/>
             <a:ext cx="811119" cy="184666"/>
           </a:xfrm>
           <a:prstGeom prst="rect">
@@ -38581,7 +38581,7 @@
         </p:nvSpPr>
         <p:spPr>
           <a:xfrm>
-            <a:off x="3538718" y="3888321"/>
+            <a:off x="5502099" y="3691980"/>
             <a:ext cx="771612" cy="380480"/>
           </a:xfrm>
           <a:prstGeom prst="rect">
@@ -38633,7 +38633,7 @@
         </p:nvSpPr>
         <p:spPr>
           <a:xfrm>
-            <a:off x="5266910" y="3888321"/>
+            <a:off x="7230291" y="3691980"/>
             <a:ext cx="996226" cy="380480"/>
           </a:xfrm>
           <a:prstGeom prst="rect">
@@ -38673,63 +38673,6 @@
       </p:sp>
       <p:sp>
         <p:nvSpPr>
-          <p:cNvPr id="11" name="TextBox 10">
-            <a:extLst>
-              <a:ext uri="{FF2B5EF4-FFF2-40B4-BE49-F238E27FC236}">
-                <a16:creationId xmlns:a16="http://schemas.microsoft.com/office/drawing/2014/main" id="{AAB15F80-8B7F-8B6E-CA14-3906A9333B29}"/>
-              </a:ext>
-            </a:extLst>
-          </p:cNvPr>
-          <p:cNvSpPr txBox="1"/>
-          <p:nvPr/>
-        </p:nvSpPr>
-        <p:spPr>
-          <a:xfrm>
-            <a:off x="5583928" y="3363825"/>
-            <a:ext cx="1353695" cy="380480"/>
-          </a:xfrm>
-          <a:prstGeom prst="rect">
-            <a:avLst/>
-          </a:prstGeom>
-          <a:solidFill>
-            <a:schemeClr val="accent6">
-              <a:lumMod val="40000"/>
-              <a:lumOff val="60000"/>
-            </a:schemeClr>
-          </a:solidFill>
-        </p:spPr>
-        <p:txBody>
-          <a:bodyPr wrap="none" lIns="36000" tIns="36000" rIns="36000" bIns="36000" rtlCol="0">
-            <a:spAutoFit/>
-          </a:bodyPr>
-          <a:lstStyle/>
-          <a:p>
-            <a:pPr algn="l">
-              <a:lnSpc>
-                <a:spcPct val="100000"/>
-              </a:lnSpc>
-              <a:spcBef>
-                <a:spcPts val="600"/>
-              </a:spcBef>
-            </a:pPr>
-            <a:r>
-              <a:rPr lang="en-GB" sz="2000" dirty="0" err="1">
-                <a:solidFill>
-                  <a:schemeClr val="accent1"/>
-                </a:solidFill>
-              </a:rPr>
-              <a:t>VariableNP</a:t>
-            </a:r>
-            <a:endParaRPr lang="en-GB" sz="2000" dirty="0">
-              <a:solidFill>
-                <a:schemeClr val="accent1"/>
-              </a:solidFill>
-            </a:endParaRPr>
-          </a:p>
-        </p:txBody>
-      </p:sp>
-      <p:sp>
-        <p:nvSpPr>
           <p:cNvPr id="13" name="TextBox 12">
             <a:extLst>
               <a:ext uri="{FF2B5EF4-FFF2-40B4-BE49-F238E27FC236}">
@@ -38742,8 +38685,8 @@
         </p:nvSpPr>
         <p:spPr>
           <a:xfrm>
-            <a:off x="3303664" y="3240249"/>
-            <a:ext cx="1293624" cy="184666"/>
+            <a:off x="5267045" y="3043908"/>
+            <a:ext cx="1226298" cy="184666"/>
           </a:xfrm>
           <a:prstGeom prst="rect">
             <a:avLst/>
@@ -38765,18 +38708,13 @@
               </a:spcBef>
             </a:pPr>
             <a:r>
-              <a:rPr lang="en-GB" sz="1200" dirty="0" err="1">
+              <a:rPr lang="en-GB" sz="1200" dirty="0">
                 <a:solidFill>
                   <a:schemeClr val="accent1"/>
                 </a:solidFill>
               </a:rPr>
-              <a:t>Component_model</a:t>
-            </a:r>
-            <a:endParaRPr lang="en-GB" sz="1200" dirty="0">
-              <a:solidFill>
-                <a:schemeClr val="accent1"/>
-              </a:solidFill>
-            </a:endParaRPr>
+              <a:t>component-model</a:t>
+            </a:r>
           </a:p>
         </p:txBody>
       </p:sp>
@@ -38794,7 +38732,7 @@
         </p:nvSpPr>
         <p:spPr>
           <a:xfrm>
-            <a:off x="6528048" y="2130065"/>
+            <a:off x="8491429" y="1933724"/>
             <a:ext cx="771612" cy="380480"/>
           </a:xfrm>
           <a:prstGeom prst="rect">
@@ -38846,7 +38784,7 @@
         </p:nvSpPr>
         <p:spPr>
           <a:xfrm>
-            <a:off x="5093173" y="2123732"/>
+            <a:off x="7056554" y="1927391"/>
             <a:ext cx="1256169" cy="380480"/>
           </a:xfrm>
           <a:prstGeom prst="rect">
@@ -38903,8 +38841,8 @@
         </p:nvSpPr>
         <p:spPr>
           <a:xfrm>
-            <a:off x="3303530" y="2120847"/>
-            <a:ext cx="1573114" cy="380480"/>
+            <a:off x="5015880" y="1924506"/>
+            <a:ext cx="1901730" cy="380480"/>
           </a:xfrm>
           <a:prstGeom prst="rect">
             <a:avLst/>
@@ -38931,18 +38869,13 @@
               </a:spcBef>
             </a:pPr>
             <a:r>
-              <a:rPr lang="en-GB" sz="2000" dirty="0" err="1">
+              <a:rPr lang="en-GB" sz="2000" dirty="0">
                 <a:solidFill>
                   <a:schemeClr val="accent1"/>
                 </a:solidFill>
               </a:rPr>
-              <a:t>BouncingBall</a:t>
-            </a:r>
-            <a:endParaRPr lang="en-GB" sz="2000" dirty="0">
-              <a:solidFill>
-                <a:schemeClr val="accent1"/>
-              </a:solidFill>
-            </a:endParaRPr>
+              <a:t>BouncingBall3D</a:t>
+            </a:r>
           </a:p>
         </p:txBody>
       </p:sp>
@@ -38960,8 +38893,8 @@
         </p:nvSpPr>
         <p:spPr>
           <a:xfrm>
-            <a:off x="7799570" y="4022579"/>
-            <a:ext cx="784189" cy="492443"/>
+            <a:off x="9762951" y="3286083"/>
+            <a:ext cx="1104790" cy="738664"/>
           </a:xfrm>
           <a:prstGeom prst="rect">
             <a:avLst/>
@@ -39007,35 +38940,6 @@
               <a:t>Range</a:t>
             </a:r>
           </a:p>
-        </p:txBody>
-      </p:sp>
-      <p:sp>
-        <p:nvSpPr>
-          <p:cNvPr id="18" name="TextBox 17">
-            <a:extLst>
-              <a:ext uri="{FF2B5EF4-FFF2-40B4-BE49-F238E27FC236}">
-                <a16:creationId xmlns:a16="http://schemas.microsoft.com/office/drawing/2014/main" id="{FF2BC411-3693-BA1F-2F6B-7190E7E0C641}"/>
-              </a:ext>
-            </a:extLst>
-          </p:cNvPr>
-          <p:cNvSpPr txBox="1"/>
-          <p:nvPr/>
-        </p:nvSpPr>
-        <p:spPr>
-          <a:xfrm>
-            <a:off x="8036876" y="3238085"/>
-            <a:ext cx="763222" cy="246221"/>
-          </a:xfrm>
-          <a:prstGeom prst="rect">
-            <a:avLst/>
-          </a:prstGeom>
-          <a:noFill/>
-        </p:spPr>
-        <p:txBody>
-          <a:bodyPr wrap="none" lIns="0" tIns="0" rIns="0" bIns="0" rtlCol="0">
-            <a:spAutoFit/>
-          </a:bodyPr>
-          <a:lstStyle/>
           <a:p>
             <a:pPr marL="180000" indent="-180000" algn="l">
               <a:lnSpc>
@@ -39050,7 +38954,7 @@
                   <a:schemeClr val="accent1"/>
                 </a:solidFill>
               </a:rPr>
-              <a:t>Vector</a:t>
+              <a:t>NP-arrays</a:t>
             </a:r>
           </a:p>
         </p:txBody>
@@ -39072,54 +38976,9 @@
           <p:nvPr/>
         </p:nvCxnSpPr>
         <p:spPr>
-          <a:xfrm>
-            <a:off x="6263136" y="4078561"/>
-            <a:ext cx="1536434" cy="190240"/>
-          </a:xfrm>
-          <a:prstGeom prst="line">
-            <a:avLst/>
-          </a:prstGeom>
-          <a:ln>
-            <a:solidFill>
-              <a:srgbClr val="0070C0"/>
-            </a:solidFill>
-          </a:ln>
-        </p:spPr>
-        <p:style>
-          <a:lnRef idx="1">
-            <a:schemeClr val="accent1"/>
-          </a:lnRef>
-          <a:fillRef idx="0">
-            <a:schemeClr val="accent1"/>
-          </a:fillRef>
-          <a:effectRef idx="0">
-            <a:schemeClr val="accent1"/>
-          </a:effectRef>
-          <a:fontRef idx="minor">
-            <a:schemeClr val="tx1"/>
-          </a:fontRef>
-        </p:style>
-      </p:cxnSp>
-      <p:cxnSp>
-        <p:nvCxnSpPr>
-          <p:cNvPr id="22" name="Straight Connector 21">
-            <a:extLst>
-              <a:ext uri="{FF2B5EF4-FFF2-40B4-BE49-F238E27FC236}">
-                <a16:creationId xmlns:a16="http://schemas.microsoft.com/office/drawing/2014/main" id="{8DD67ADF-6939-70A9-9258-27F377638E4D}"/>
-              </a:ext>
-            </a:extLst>
-          </p:cNvPr>
-          <p:cNvCxnSpPr>
-            <a:cxnSpLocks/>
-            <a:stCxn id="11" idx="3"/>
-            <a:endCxn id="18" idx="1"/>
-          </p:cNvCxnSpPr>
-          <p:nvPr/>
-        </p:nvCxnSpPr>
-        <p:spPr>
           <a:xfrm flipV="1">
-            <a:off x="6937623" y="3361196"/>
-            <a:ext cx="1099253" cy="192869"/>
+            <a:off x="8226517" y="3655415"/>
+            <a:ext cx="1536434" cy="226805"/>
           </a:xfrm>
           <a:prstGeom prst="line">
             <a:avLst/>
@@ -39159,8 +39018,8 @@
         </p:nvSpPr>
         <p:spPr>
           <a:xfrm>
-            <a:off x="813153" y="3721349"/>
-            <a:ext cx="2171557" cy="492443"/>
+            <a:off x="101250" y="3136241"/>
+            <a:ext cx="5030544" cy="738664"/>
           </a:xfrm>
           <a:prstGeom prst="rect">
             <a:avLst/>
@@ -39206,53 +39065,25 @@
               <a:t>FMU build process</a:t>
             </a:r>
           </a:p>
+          <a:p>
+            <a:pPr marL="180000" indent="-180000" algn="l">
+              <a:lnSpc>
+                <a:spcPct val="100000"/>
+              </a:lnSpc>
+              <a:buFont typeface="Arial" panose="020B0604020202020204" pitchFamily="34" charset="0"/>
+              <a:buChar char="•"/>
+            </a:pPr>
+            <a:r>
+              <a:rPr lang="en-GB" sz="1600" dirty="0">
+                <a:solidFill>
+                  <a:schemeClr val="accent1"/>
+                </a:solidFill>
+              </a:rPr>
+              <a:t>https://github.com/dnv-opensource/component-model</a:t>
+            </a:r>
+          </a:p>
         </p:txBody>
       </p:sp>
-      <p:cxnSp>
-        <p:nvCxnSpPr>
-          <p:cNvPr id="26" name="Straight Connector 25">
-            <a:extLst>
-              <a:ext uri="{FF2B5EF4-FFF2-40B4-BE49-F238E27FC236}">
-                <a16:creationId xmlns:a16="http://schemas.microsoft.com/office/drawing/2014/main" id="{A58D07B9-A4DE-D574-EB2C-9D729A2B9328}"/>
-              </a:ext>
-            </a:extLst>
-          </p:cNvPr>
-          <p:cNvCxnSpPr>
-            <a:cxnSpLocks/>
-            <a:stCxn id="25" idx="3"/>
-            <a:endCxn id="9" idx="1"/>
-          </p:cNvCxnSpPr>
-          <p:nvPr/>
-        </p:nvCxnSpPr>
-        <p:spPr>
-          <a:xfrm>
-            <a:off x="2984710" y="3967571"/>
-            <a:ext cx="554008" cy="110990"/>
-          </a:xfrm>
-          <a:prstGeom prst="line">
-            <a:avLst/>
-          </a:prstGeom>
-          <a:ln>
-            <a:solidFill>
-              <a:srgbClr val="0070C0"/>
-            </a:solidFill>
-          </a:ln>
-        </p:spPr>
-        <p:style>
-          <a:lnRef idx="1">
-            <a:schemeClr val="accent1"/>
-          </a:lnRef>
-          <a:fillRef idx="0">
-            <a:schemeClr val="accent1"/>
-          </a:fillRef>
-          <a:effectRef idx="0">
-            <a:schemeClr val="accent1"/>
-          </a:effectRef>
-          <a:fontRef idx="minor">
-            <a:schemeClr val="tx1"/>
-          </a:fontRef>
-        </p:style>
-      </p:cxnSp>
       <p:cxnSp>
         <p:nvCxnSpPr>
           <p:cNvPr id="30" name="Straight Connector 29">
@@ -39271,7 +39102,7 @@
         </p:nvCxnSpPr>
         <p:spPr>
           <a:xfrm>
-            <a:off x="4824896" y="5374705"/>
+            <a:off x="6788277" y="5178364"/>
             <a:ext cx="442015" cy="0"/>
           </a:xfrm>
           <a:prstGeom prst="line">
@@ -39316,53 +39147,8 @@
         </p:nvCxnSpPr>
         <p:spPr>
           <a:xfrm>
-            <a:off x="4310330" y="4078561"/>
+            <a:off x="6273711" y="3882220"/>
             <a:ext cx="956580" cy="0"/>
-          </a:xfrm>
-          <a:prstGeom prst="line">
-            <a:avLst/>
-          </a:prstGeom>
-          <a:ln>
-            <a:solidFill>
-              <a:srgbClr val="0070C0"/>
-            </a:solidFill>
-          </a:ln>
-        </p:spPr>
-        <p:style>
-          <a:lnRef idx="1">
-            <a:schemeClr val="accent1"/>
-          </a:lnRef>
-          <a:fillRef idx="0">
-            <a:schemeClr val="accent1"/>
-          </a:fillRef>
-          <a:effectRef idx="0">
-            <a:schemeClr val="accent1"/>
-          </a:effectRef>
-          <a:fontRef idx="minor">
-            <a:schemeClr val="tx1"/>
-          </a:fontRef>
-        </p:style>
-      </p:cxnSp>
-      <p:cxnSp>
-        <p:nvCxnSpPr>
-          <p:cNvPr id="35" name="Straight Connector 34">
-            <a:extLst>
-              <a:ext uri="{FF2B5EF4-FFF2-40B4-BE49-F238E27FC236}">
-                <a16:creationId xmlns:a16="http://schemas.microsoft.com/office/drawing/2014/main" id="{AFFBC32F-37FF-B5D8-335B-5DA1D986D8B6}"/>
-              </a:ext>
-            </a:extLst>
-          </p:cNvPr>
-          <p:cNvCxnSpPr>
-            <a:cxnSpLocks/>
-            <a:stCxn id="9" idx="3"/>
-            <a:endCxn id="11" idx="1"/>
-          </p:cNvCxnSpPr>
-          <p:nvPr/>
-        </p:nvCxnSpPr>
-        <p:spPr>
-          <a:xfrm flipV="1">
-            <a:off x="4310330" y="3554065"/>
-            <a:ext cx="1273598" cy="524496"/>
           </a:xfrm>
           <a:prstGeom prst="line">
             <a:avLst/>
@@ -39406,7 +39192,7 @@
         </p:nvCxnSpPr>
         <p:spPr>
           <a:xfrm flipH="1" flipV="1">
-            <a:off x="3924524" y="4268801"/>
+            <a:off x="5887905" y="4072460"/>
             <a:ext cx="257284" cy="915664"/>
           </a:xfrm>
           <a:prstGeom prst="line">
@@ -39451,7 +39237,7 @@
         </p:nvCxnSpPr>
         <p:spPr>
           <a:xfrm flipH="1" flipV="1">
-            <a:off x="5765023" y="4268801"/>
+            <a:off x="7728404" y="4072460"/>
             <a:ext cx="363883" cy="915664"/>
           </a:xfrm>
           <a:prstGeom prst="line">
@@ -39496,7 +39282,7 @@
         </p:nvCxnSpPr>
         <p:spPr>
           <a:xfrm flipH="1">
-            <a:off x="5239672" y="2510545"/>
+            <a:off x="7203053" y="2314204"/>
             <a:ext cx="1674182" cy="727540"/>
           </a:xfrm>
           <a:prstGeom prst="line">
@@ -39541,7 +39327,7 @@
         </p:nvCxnSpPr>
         <p:spPr>
           <a:xfrm flipH="1">
-            <a:off x="5239672" y="2504212"/>
+            <a:off x="7203053" y="2307871"/>
             <a:ext cx="481586" cy="733873"/>
           </a:xfrm>
           <a:prstGeom prst="line">
@@ -39585,8 +39371,8 @@
         </p:nvCxnSpPr>
         <p:spPr>
           <a:xfrm>
-            <a:off x="4090087" y="2501327"/>
-            <a:ext cx="1149585" cy="730425"/>
+            <a:off x="5966745" y="2304986"/>
+            <a:ext cx="985277" cy="730425"/>
           </a:xfrm>
           <a:prstGeom prst="line">
             <a:avLst/>
@@ -39626,7 +39412,7 @@
         </p:nvSpPr>
         <p:spPr>
           <a:xfrm>
-            <a:off x="7795427" y="5150553"/>
+            <a:off x="9758808" y="4954212"/>
             <a:ext cx="944489" cy="246221"/>
           </a:xfrm>
           <a:prstGeom prst="rect">
@@ -39676,7 +39462,7 @@
         </p:nvCxnSpPr>
         <p:spPr>
           <a:xfrm>
-            <a:off x="7139119" y="5256473"/>
+            <a:off x="9102500" y="5060132"/>
             <a:ext cx="656308" cy="17191"/>
           </a:xfrm>
           <a:prstGeom prst="line">
@@ -39717,7 +39503,7 @@
         </p:nvSpPr>
         <p:spPr>
           <a:xfrm>
-            <a:off x="7464152" y="2132856"/>
+            <a:off x="9427533" y="1936515"/>
             <a:ext cx="1940202" cy="380480"/>
           </a:xfrm>
           <a:prstGeom prst="rect">
@@ -39778,7 +39564,7 @@
         </p:nvCxnSpPr>
         <p:spPr>
           <a:xfrm flipH="1">
-            <a:off x="5239672" y="2513336"/>
+            <a:off x="7203053" y="2316995"/>
             <a:ext cx="3194581" cy="724749"/>
           </a:xfrm>
           <a:prstGeom prst="line">

</xml_diff>

<commit_message>
Draft changes with respect to using the ECCO algorithm within libcosimpy
</commit_message>
<xml_diff>
--- a/docs/source/component-model.pptx
+++ b/docs/source/component-model.pptx
@@ -5,19 +5,20 @@
     <p:sldMasterId id="2147483648" r:id="rId1"/>
   </p:sldMasterIdLst>
   <p:notesMasterIdLst>
-    <p:notesMasterId r:id="rId9"/>
+    <p:notesMasterId r:id="rId10"/>
   </p:notesMasterIdLst>
   <p:handoutMasterIdLst>
-    <p:handoutMasterId r:id="rId10"/>
+    <p:handoutMasterId r:id="rId11"/>
   </p:handoutMasterIdLst>
   <p:sldIdLst>
     <p:sldId id="268" r:id="rId2"/>
     <p:sldId id="269" r:id="rId3"/>
-    <p:sldId id="275" r:id="rId4"/>
-    <p:sldId id="276" r:id="rId5"/>
-    <p:sldId id="278" r:id="rId6"/>
-    <p:sldId id="279" r:id="rId7"/>
-    <p:sldId id="270" r:id="rId8"/>
+    <p:sldId id="280" r:id="rId4"/>
+    <p:sldId id="275" r:id="rId5"/>
+    <p:sldId id="276" r:id="rId6"/>
+    <p:sldId id="278" r:id="rId7"/>
+    <p:sldId id="279" r:id="rId8"/>
+    <p:sldId id="270" r:id="rId9"/>
   </p:sldIdLst>
   <p:sldSz cx="12192000" cy="6858000"/>
   <p:notesSz cx="6858000" cy="9144000"/>
@@ -186,7 +187,7 @@
           <a:p>
             <a:fld id="{681EF29B-F0DE-4A5D-971E-F0D2D074F34E}" type="datetime4">
               <a:rPr lang="en-GB" smtClean="0"/>
-              <a:t>19 November 2024</a:t>
+              <a:t>30 May 2025</a:t>
             </a:fld>
             <a:endParaRPr lang="en-GB" sz="800" dirty="0"/>
           </a:p>
@@ -1238,7 +1239,7 @@
           <a:p>
             <a:fld id="{681EF29B-F0DE-4A5D-971E-F0D2D074F34E}" type="datetime4">
               <a:rPr lang="en-GB" smtClean="0"/>
-              <a:t>19 November 2024</a:t>
+              <a:t>30 May 2025</a:t>
             </a:fld>
             <a:endParaRPr lang="en-GB" sz="800" dirty="0"/>
           </a:p>
@@ -1706,7 +1707,7 @@
           <a:bodyPr/>
           <a:lstStyle/>
           <a:p>
-            <a:endParaRPr lang="en-GB" dirty="0"/>
+            <a:endParaRPr lang="en-GB"/>
           </a:p>
         </p:txBody>
       </p:sp>
@@ -1728,7 +1729,367 @@
             <a:fld id="{A16CFAD1-D197-4A88-B173-A6412E995EE5}" type="slidenum">
               <a:rPr lang="en-GB" smtClean="0"/>
               <a:pPr/>
+              <a:t>4</a:t>
+            </a:fld>
+            <a:endParaRPr lang="en-GB" sz="800"/>
+          </a:p>
+        </p:txBody>
+      </p:sp>
+    </p:spTree>
+    <p:extLst>
+      <p:ext uri="{BB962C8B-B14F-4D97-AF65-F5344CB8AC3E}">
+        <p14:creationId xmlns:p14="http://schemas.microsoft.com/office/powerpoint/2010/main" val="4008923162"/>
+      </p:ext>
+    </p:extLst>
+  </p:cSld>
+  <p:clrMapOvr>
+    <a:masterClrMapping/>
+  </p:clrMapOvr>
+</p:notes>
+</file>
+
+<file path=ppt/notesSlides/notesSlide4.xml><?xml version="1.0" encoding="utf-8"?>
+<p:notes xmlns:a="http://schemas.openxmlformats.org/drawingml/2006/main" xmlns:r="http://schemas.openxmlformats.org/officeDocument/2006/relationships" xmlns:p="http://schemas.openxmlformats.org/presentationml/2006/main">
+  <p:cSld>
+    <p:spTree>
+      <p:nvGrpSpPr>
+        <p:cNvPr id="1" name=""/>
+        <p:cNvGrpSpPr/>
+        <p:nvPr/>
+      </p:nvGrpSpPr>
+      <p:grpSpPr>
+        <a:xfrm>
+          <a:off x="0" y="0"/>
+          <a:ext cx="0" cy="0"/>
+          <a:chOff x="0" y="0"/>
+          <a:chExt cx="0" cy="0"/>
+        </a:xfrm>
+      </p:grpSpPr>
+      <p:sp>
+        <p:nvSpPr>
+          <p:cNvPr id="2" name="Slide Image Placeholder 1"/>
+          <p:cNvSpPr>
+            <a:spLocks noGrp="1" noRot="1" noChangeAspect="1"/>
+          </p:cNvSpPr>
+          <p:nvPr>
+            <p:ph type="sldImg"/>
+          </p:nvPr>
+        </p:nvSpPr>
+        <p:spPr>
+          <a:xfrm>
+            <a:off x="360363" y="685800"/>
+            <a:ext cx="6137275" cy="3452813"/>
+          </a:xfrm>
+        </p:spPr>
+      </p:sp>
+      <p:sp>
+        <p:nvSpPr>
+          <p:cNvPr id="3" name="Notes Placeholder 2"/>
+          <p:cNvSpPr>
+            <a:spLocks noGrp="1"/>
+          </p:cNvSpPr>
+          <p:nvPr>
+            <p:ph type="body" idx="1"/>
+          </p:nvPr>
+        </p:nvSpPr>
+        <p:spPr/>
+        <p:txBody>
+          <a:bodyPr/>
+          <a:lstStyle/>
+          <a:p>
+            <a:endParaRPr lang="en-GB"/>
+          </a:p>
+        </p:txBody>
+      </p:sp>
+      <p:sp>
+        <p:nvSpPr>
+          <p:cNvPr id="4" name="Slide Number Placeholder 3"/>
+          <p:cNvSpPr>
+            <a:spLocks noGrp="1"/>
+          </p:cNvSpPr>
+          <p:nvPr>
+            <p:ph type="sldNum" sz="quarter" idx="5"/>
+          </p:nvPr>
+        </p:nvSpPr>
+        <p:spPr/>
+        <p:txBody>
+          <a:bodyPr/>
+          <a:lstStyle/>
+          <a:p>
+            <a:fld id="{A16CFAD1-D197-4A88-B173-A6412E995EE5}" type="slidenum">
+              <a:rPr lang="en-GB" smtClean="0"/>
+              <a:pPr/>
+              <a:t>5</a:t>
+            </a:fld>
+            <a:endParaRPr lang="en-GB" sz="800"/>
+          </a:p>
+        </p:txBody>
+      </p:sp>
+    </p:spTree>
+    <p:extLst>
+      <p:ext uri="{BB962C8B-B14F-4D97-AF65-F5344CB8AC3E}">
+        <p14:creationId xmlns:p14="http://schemas.microsoft.com/office/powerpoint/2010/main" val="2806897937"/>
+      </p:ext>
+    </p:extLst>
+  </p:cSld>
+  <p:clrMapOvr>
+    <a:masterClrMapping/>
+  </p:clrMapOvr>
+</p:notes>
+</file>
+
+<file path=ppt/notesSlides/notesSlide5.xml><?xml version="1.0" encoding="utf-8"?>
+<p:notes xmlns:a="http://schemas.openxmlformats.org/drawingml/2006/main" xmlns:r="http://schemas.openxmlformats.org/officeDocument/2006/relationships" xmlns:p="http://schemas.openxmlformats.org/presentationml/2006/main">
+  <p:cSld>
+    <p:spTree>
+      <p:nvGrpSpPr>
+        <p:cNvPr id="1" name=""/>
+        <p:cNvGrpSpPr/>
+        <p:nvPr/>
+      </p:nvGrpSpPr>
+      <p:grpSpPr>
+        <a:xfrm>
+          <a:off x="0" y="0"/>
+          <a:ext cx="0" cy="0"/>
+          <a:chOff x="0" y="0"/>
+          <a:chExt cx="0" cy="0"/>
+        </a:xfrm>
+      </p:grpSpPr>
+      <p:sp>
+        <p:nvSpPr>
+          <p:cNvPr id="2" name="Slide Image Placeholder 1"/>
+          <p:cNvSpPr>
+            <a:spLocks noGrp="1" noRot="1" noChangeAspect="1"/>
+          </p:cNvSpPr>
+          <p:nvPr>
+            <p:ph type="sldImg"/>
+          </p:nvPr>
+        </p:nvSpPr>
+        <p:spPr>
+          <a:xfrm>
+            <a:off x="360363" y="685800"/>
+            <a:ext cx="6137275" cy="3452813"/>
+          </a:xfrm>
+        </p:spPr>
+      </p:sp>
+      <p:sp>
+        <p:nvSpPr>
+          <p:cNvPr id="3" name="Notes Placeholder 2"/>
+          <p:cNvSpPr>
+            <a:spLocks noGrp="1"/>
+          </p:cNvSpPr>
+          <p:nvPr>
+            <p:ph type="body" idx="1"/>
+          </p:nvPr>
+        </p:nvSpPr>
+        <p:spPr/>
+        <p:txBody>
+          <a:bodyPr/>
+          <a:lstStyle/>
+          <a:p>
+            <a:endParaRPr lang="en-GB"/>
+          </a:p>
+        </p:txBody>
+      </p:sp>
+      <p:sp>
+        <p:nvSpPr>
+          <p:cNvPr id="4" name="Slide Number Placeholder 3"/>
+          <p:cNvSpPr>
+            <a:spLocks noGrp="1"/>
+          </p:cNvSpPr>
+          <p:nvPr>
+            <p:ph type="sldNum" sz="quarter" idx="5"/>
+          </p:nvPr>
+        </p:nvSpPr>
+        <p:spPr/>
+        <p:txBody>
+          <a:bodyPr/>
+          <a:lstStyle/>
+          <a:p>
+            <a:fld id="{A16CFAD1-D197-4A88-B173-A6412E995EE5}" type="slidenum">
+              <a:rPr lang="en-GB" smtClean="0"/>
+              <a:pPr/>
+              <a:t>6</a:t>
+            </a:fld>
+            <a:endParaRPr lang="en-GB" sz="800"/>
+          </a:p>
+        </p:txBody>
+      </p:sp>
+    </p:spTree>
+    <p:extLst>
+      <p:ext uri="{BB962C8B-B14F-4D97-AF65-F5344CB8AC3E}">
+        <p14:creationId xmlns:p14="http://schemas.microsoft.com/office/powerpoint/2010/main" val="457150928"/>
+      </p:ext>
+    </p:extLst>
+  </p:cSld>
+  <p:clrMapOvr>
+    <a:masterClrMapping/>
+  </p:clrMapOvr>
+</p:notes>
+</file>
+
+<file path=ppt/notesSlides/notesSlide6.xml><?xml version="1.0" encoding="utf-8"?>
+<p:notes xmlns:a="http://schemas.openxmlformats.org/drawingml/2006/main" xmlns:r="http://schemas.openxmlformats.org/officeDocument/2006/relationships" xmlns:p="http://schemas.openxmlformats.org/presentationml/2006/main">
+  <p:cSld>
+    <p:spTree>
+      <p:nvGrpSpPr>
+        <p:cNvPr id="1" name=""/>
+        <p:cNvGrpSpPr/>
+        <p:nvPr/>
+      </p:nvGrpSpPr>
+      <p:grpSpPr>
+        <a:xfrm>
+          <a:off x="0" y="0"/>
+          <a:ext cx="0" cy="0"/>
+          <a:chOff x="0" y="0"/>
+          <a:chExt cx="0" cy="0"/>
+        </a:xfrm>
+      </p:grpSpPr>
+      <p:sp>
+        <p:nvSpPr>
+          <p:cNvPr id="2" name="Slide Image Placeholder 1"/>
+          <p:cNvSpPr>
+            <a:spLocks noGrp="1" noRot="1" noChangeAspect="1"/>
+          </p:cNvSpPr>
+          <p:nvPr>
+            <p:ph type="sldImg"/>
+          </p:nvPr>
+        </p:nvSpPr>
+        <p:spPr>
+          <a:xfrm>
+            <a:off x="360363" y="685800"/>
+            <a:ext cx="6137275" cy="3452813"/>
+          </a:xfrm>
+        </p:spPr>
+      </p:sp>
+      <p:sp>
+        <p:nvSpPr>
+          <p:cNvPr id="3" name="Notes Placeholder 2"/>
+          <p:cNvSpPr>
+            <a:spLocks noGrp="1"/>
+          </p:cNvSpPr>
+          <p:nvPr>
+            <p:ph type="body" idx="1"/>
+          </p:nvPr>
+        </p:nvSpPr>
+        <p:spPr/>
+        <p:txBody>
+          <a:bodyPr/>
+          <a:lstStyle/>
+          <a:p>
+            <a:endParaRPr lang="en-GB"/>
+          </a:p>
+        </p:txBody>
+      </p:sp>
+      <p:sp>
+        <p:nvSpPr>
+          <p:cNvPr id="4" name="Slide Number Placeholder 3"/>
+          <p:cNvSpPr>
+            <a:spLocks noGrp="1"/>
+          </p:cNvSpPr>
+          <p:nvPr>
+            <p:ph type="sldNum" sz="quarter" idx="5"/>
+          </p:nvPr>
+        </p:nvSpPr>
+        <p:spPr/>
+        <p:txBody>
+          <a:bodyPr/>
+          <a:lstStyle/>
+          <a:p>
+            <a:fld id="{A16CFAD1-D197-4A88-B173-A6412E995EE5}" type="slidenum">
+              <a:rPr lang="en-GB" smtClean="0"/>
+              <a:pPr/>
               <a:t>7</a:t>
+            </a:fld>
+            <a:endParaRPr lang="en-GB" sz="800"/>
+          </a:p>
+        </p:txBody>
+      </p:sp>
+    </p:spTree>
+    <p:extLst>
+      <p:ext uri="{BB962C8B-B14F-4D97-AF65-F5344CB8AC3E}">
+        <p14:creationId xmlns:p14="http://schemas.microsoft.com/office/powerpoint/2010/main" val="2630057827"/>
+      </p:ext>
+    </p:extLst>
+  </p:cSld>
+  <p:clrMapOvr>
+    <a:masterClrMapping/>
+  </p:clrMapOvr>
+</p:notes>
+</file>
+
+<file path=ppt/notesSlides/notesSlide7.xml><?xml version="1.0" encoding="utf-8"?>
+<p:notes xmlns:a="http://schemas.openxmlformats.org/drawingml/2006/main" xmlns:r="http://schemas.openxmlformats.org/officeDocument/2006/relationships" xmlns:p="http://schemas.openxmlformats.org/presentationml/2006/main">
+  <p:cSld>
+    <p:spTree>
+      <p:nvGrpSpPr>
+        <p:cNvPr id="1" name=""/>
+        <p:cNvGrpSpPr/>
+        <p:nvPr/>
+      </p:nvGrpSpPr>
+      <p:grpSpPr>
+        <a:xfrm>
+          <a:off x="0" y="0"/>
+          <a:ext cx="0" cy="0"/>
+          <a:chOff x="0" y="0"/>
+          <a:chExt cx="0" cy="0"/>
+        </a:xfrm>
+      </p:grpSpPr>
+      <p:sp>
+        <p:nvSpPr>
+          <p:cNvPr id="2" name="Slide Image Placeholder 1"/>
+          <p:cNvSpPr>
+            <a:spLocks noGrp="1" noRot="1" noChangeAspect="1"/>
+          </p:cNvSpPr>
+          <p:nvPr>
+            <p:ph type="sldImg"/>
+          </p:nvPr>
+        </p:nvSpPr>
+        <p:spPr>
+          <a:xfrm>
+            <a:off x="360363" y="685800"/>
+            <a:ext cx="6137275" cy="3452813"/>
+          </a:xfrm>
+        </p:spPr>
+      </p:sp>
+      <p:sp>
+        <p:nvSpPr>
+          <p:cNvPr id="3" name="Notes Placeholder 2"/>
+          <p:cNvSpPr>
+            <a:spLocks noGrp="1"/>
+          </p:cNvSpPr>
+          <p:nvPr>
+            <p:ph type="body" idx="1"/>
+          </p:nvPr>
+        </p:nvSpPr>
+        <p:spPr/>
+        <p:txBody>
+          <a:bodyPr/>
+          <a:lstStyle/>
+          <a:p>
+            <a:endParaRPr lang="en-GB" dirty="0"/>
+          </a:p>
+        </p:txBody>
+      </p:sp>
+      <p:sp>
+        <p:nvSpPr>
+          <p:cNvPr id="4" name="Slide Number Placeholder 3"/>
+          <p:cNvSpPr>
+            <a:spLocks noGrp="1"/>
+          </p:cNvSpPr>
+          <p:nvPr>
+            <p:ph type="sldNum" sz="quarter" idx="5"/>
+          </p:nvPr>
+        </p:nvSpPr>
+        <p:spPr/>
+        <p:txBody>
+          <a:bodyPr/>
+          <a:lstStyle/>
+          <a:p>
+            <a:fld id="{A16CFAD1-D197-4A88-B173-A6412E995EE5}" type="slidenum">
+              <a:rPr lang="en-GB" smtClean="0"/>
+              <a:pPr/>
+              <a:t>8</a:t>
             </a:fld>
             <a:endParaRPr lang="en-GB" sz="800" dirty="0"/>
           </a:p>
@@ -8801,7 +9162,7 @@
             <a:fld id="{727BBD34-DD59-49E1-9776-D67684F06344}" type="datetime4">
               <a:rPr lang="en-GB" smtClean="0"/>
               <a:pPr/>
-              <a:t>19 November 2024</a:t>
+              <a:t>30 May 2025</a:t>
             </a:fld>
             <a:endParaRPr lang="en-GB" dirty="0"/>
           </a:p>
@@ -10094,7 +10455,7 @@
             <a:fld id="{727BBD34-DD59-49E1-9776-D67684F06344}" type="datetime4">
               <a:rPr lang="en-GB" smtClean="0"/>
               <a:pPr/>
-              <a:t>19 November 2024</a:t>
+              <a:t>30 May 2025</a:t>
             </a:fld>
             <a:endParaRPr lang="en-GB" dirty="0"/>
           </a:p>
@@ -25311,7 +25672,7 @@
           <a:p>
             <a:fld id="{6F52A3B9-C46E-47C2-A1FB-F5434525BDF4}" type="datetime4">
               <a:rPr lang="en-GB" smtClean="0"/>
-              <a:t>19 November 2024</a:t>
+              <a:t>30 May 2025</a:t>
             </a:fld>
             <a:endParaRPr lang="en-GB" dirty="0"/>
           </a:p>
@@ -38732,8 +39093,8 @@
         </p:nvSpPr>
         <p:spPr>
           <a:xfrm>
-            <a:off x="8491429" y="1933724"/>
-            <a:ext cx="771612" cy="380480"/>
+            <a:off x="10364948" y="1933724"/>
+            <a:ext cx="1225263" cy="380480"/>
           </a:xfrm>
           <a:prstGeom prst="rect">
             <a:avLst/>
@@ -38765,8 +39126,21 @@
                   <a:schemeClr val="accent1"/>
                 </a:solidFill>
               </a:rPr>
-              <a:t>Crane</a:t>
-            </a:r>
+              <a:t>crane-</a:t>
+            </a:r>
+            <a:r>
+              <a:rPr lang="en-GB" sz="2000" dirty="0" err="1">
+                <a:solidFill>
+                  <a:schemeClr val="accent1"/>
+                </a:solidFill>
+              </a:rPr>
+              <a:t>fmu</a:t>
+            </a:r>
+            <a:endParaRPr lang="en-GB" sz="2000" dirty="0">
+              <a:solidFill>
+                <a:schemeClr val="accent1"/>
+              </a:solidFill>
+            </a:endParaRPr>
           </a:p>
         </p:txBody>
       </p:sp>
@@ -38785,7 +39159,7 @@
         <p:spPr>
           <a:xfrm>
             <a:off x="7056554" y="1927391"/>
-            <a:ext cx="1256169" cy="380480"/>
+            <a:ext cx="1248281" cy="380480"/>
           </a:xfrm>
           <a:prstGeom prst="rect">
             <a:avLst/>
@@ -38817,7 +39191,7 @@
                   <a:schemeClr val="accent1"/>
                 </a:solidFill>
               </a:rPr>
-              <a:t>InputTable</a:t>
+              <a:t>TimeTable</a:t>
             </a:r>
             <a:endParaRPr lang="en-GB" sz="2000" dirty="0">
               <a:solidFill>
@@ -38894,7 +39268,7 @@
         <p:spPr>
           <a:xfrm>
             <a:off x="9762951" y="3286083"/>
-            <a:ext cx="1104790" cy="738664"/>
+            <a:ext cx="1972015" cy="1231106"/>
           </a:xfrm>
           <a:prstGeom prst="rect">
             <a:avLst/>
@@ -38955,6 +39329,40 @@
                 </a:solidFill>
               </a:rPr>
               <a:t>NP-arrays</a:t>
+            </a:r>
+          </a:p>
+          <a:p>
+            <a:pPr marL="180000" indent="-180000" algn="l">
+              <a:lnSpc>
+                <a:spcPct val="100000"/>
+              </a:lnSpc>
+              <a:buFont typeface="Arial" panose="020B0604020202020204" pitchFamily="34" charset="0"/>
+              <a:buChar char="•"/>
+            </a:pPr>
+            <a:r>
+              <a:rPr lang="en-GB" sz="1600" dirty="0">
+                <a:solidFill>
+                  <a:schemeClr val="accent1"/>
+                </a:solidFill>
+              </a:rPr>
+              <a:t>structured variables</a:t>
+            </a:r>
+          </a:p>
+          <a:p>
+            <a:pPr marL="180000" indent="-180000" algn="l">
+              <a:lnSpc>
+                <a:spcPct val="100000"/>
+              </a:lnSpc>
+              <a:buFont typeface="Arial" panose="020B0604020202020204" pitchFamily="34" charset="0"/>
+              <a:buChar char="•"/>
+            </a:pPr>
+            <a:r>
+              <a:rPr lang="en-GB" sz="1600" dirty="0">
+                <a:solidFill>
+                  <a:schemeClr val="accent1"/>
+                </a:solidFill>
+              </a:rPr>
+              <a:t>derivatives</a:t>
             </a:r>
           </a:p>
         </p:txBody>
@@ -38976,9 +39384,9 @@
           <p:nvPr/>
         </p:nvCxnSpPr>
         <p:spPr>
-          <a:xfrm flipV="1">
-            <a:off x="8226517" y="3655415"/>
-            <a:ext cx="1536434" cy="226805"/>
+          <a:xfrm>
+            <a:off x="8226517" y="3882220"/>
+            <a:ext cx="1536434" cy="19416"/>
           </a:xfrm>
           <a:prstGeom prst="line">
             <a:avLst/>
@@ -39019,7 +39427,7 @@
         <p:spPr>
           <a:xfrm>
             <a:off x="101250" y="3136241"/>
-            <a:ext cx="5030544" cy="738664"/>
+            <a:ext cx="5030544" cy="984885"/>
           </a:xfrm>
           <a:prstGeom prst="rect">
             <a:avLst/>
@@ -39046,6 +39454,23 @@
                 </a:solidFill>
               </a:rPr>
               <a:t>Variable management</a:t>
+            </a:r>
+          </a:p>
+          <a:p>
+            <a:pPr marL="180000" indent="-180000" algn="l">
+              <a:lnSpc>
+                <a:spcPct val="100000"/>
+              </a:lnSpc>
+              <a:buFont typeface="Arial" panose="020B0604020202020204" pitchFamily="34" charset="0"/>
+              <a:buChar char="•"/>
+            </a:pPr>
+            <a:r>
+              <a:rPr lang="en-GB" sz="1600" dirty="0">
+                <a:solidFill>
+                  <a:schemeClr val="accent1"/>
+                </a:solidFill>
+              </a:rPr>
+              <a:t>Derivatives</a:t>
             </a:r>
           </a:p>
           <a:p>
@@ -39283,7 +39708,7 @@
         <p:spPr>
           <a:xfrm flipH="1">
             <a:off x="7203053" y="2314204"/>
-            <a:ext cx="1674182" cy="727540"/>
+            <a:ext cx="3774527" cy="727540"/>
           </a:xfrm>
           <a:prstGeom prst="line">
             <a:avLst/>
@@ -39328,7 +39753,7 @@
         <p:spPr>
           <a:xfrm flipH="1">
             <a:off x="7203053" y="2307871"/>
-            <a:ext cx="481586" cy="733873"/>
+            <a:ext cx="477642" cy="733873"/>
           </a:xfrm>
           <a:prstGeom prst="line">
             <a:avLst/>
@@ -39366,13 +39791,14 @@
           <p:cNvCxnSpPr>
             <a:cxnSpLocks/>
             <a:stCxn id="16" idx="2"/>
+            <a:endCxn id="12" idx="0"/>
           </p:cNvCxnSpPr>
           <p:nvPr/>
         </p:nvCxnSpPr>
         <p:spPr>
           <a:xfrm>
             <a:off x="5966745" y="2304986"/>
-            <a:ext cx="985277" cy="730425"/>
+            <a:ext cx="1236308" cy="736758"/>
           </a:xfrm>
           <a:prstGeom prst="line">
             <a:avLst/>
@@ -39503,8 +39929,8 @@
         </p:nvSpPr>
         <p:spPr>
           <a:xfrm>
-            <a:off x="9427533" y="1936515"/>
-            <a:ext cx="1940202" cy="380480"/>
+            <a:off x="8410477" y="1936515"/>
+            <a:ext cx="1141907" cy="380480"/>
           </a:xfrm>
           <a:prstGeom prst="rect">
             <a:avLst/>
@@ -39531,18 +39957,13 @@
               </a:spcBef>
             </a:pPr>
             <a:r>
-              <a:rPr lang="en-GB" sz="2000" dirty="0" err="1">
+              <a:rPr lang="en-GB" sz="2000" dirty="0">
                 <a:solidFill>
                   <a:schemeClr val="accent1"/>
                 </a:solidFill>
               </a:rPr>
-              <a:t>ForcedOscillator</a:t>
-            </a:r>
-            <a:endParaRPr lang="en-GB" sz="2000" dirty="0">
-              <a:solidFill>
-                <a:schemeClr val="accent1"/>
-              </a:solidFill>
-            </a:endParaRPr>
+              <a:t>Oscillator</a:t>
+            </a:r>
           </a:p>
         </p:txBody>
       </p:sp>
@@ -39565,7 +39986,104 @@
         <p:spPr>
           <a:xfrm flipH="1">
             <a:off x="7203053" y="2316995"/>
-            <a:ext cx="3194581" cy="724749"/>
+            <a:ext cx="1778378" cy="724749"/>
+          </a:xfrm>
+          <a:prstGeom prst="line">
+            <a:avLst/>
+          </a:prstGeom>
+          <a:ln>
+            <a:solidFill>
+              <a:srgbClr val="0070C0"/>
+            </a:solidFill>
+          </a:ln>
+        </p:spPr>
+        <p:style>
+          <a:lnRef idx="1">
+            <a:schemeClr val="accent1"/>
+          </a:lnRef>
+          <a:fillRef idx="0">
+            <a:schemeClr val="accent1"/>
+          </a:fillRef>
+          <a:effectRef idx="0">
+            <a:schemeClr val="accent1"/>
+          </a:effectRef>
+          <a:fontRef idx="minor">
+            <a:schemeClr val="tx1"/>
+          </a:fontRef>
+        </p:style>
+      </p:cxnSp>
+      <p:sp>
+        <p:nvSpPr>
+          <p:cNvPr id="11" name="TextBox 10">
+            <a:extLst>
+              <a:ext uri="{FF2B5EF4-FFF2-40B4-BE49-F238E27FC236}">
+                <a16:creationId xmlns:a16="http://schemas.microsoft.com/office/drawing/2014/main" id="{D382ECC9-1C24-339E-CF5B-22976188B650}"/>
+              </a:ext>
+            </a:extLst>
+          </p:cNvPr>
+          <p:cNvSpPr txBox="1"/>
+          <p:nvPr/>
+        </p:nvSpPr>
+        <p:spPr>
+          <a:xfrm>
+            <a:off x="9685574" y="1936515"/>
+            <a:ext cx="572840" cy="380480"/>
+          </a:xfrm>
+          <a:prstGeom prst="rect">
+            <a:avLst/>
+          </a:prstGeom>
+          <a:solidFill>
+            <a:schemeClr val="accent6">
+              <a:lumMod val="60000"/>
+              <a:lumOff val="40000"/>
+            </a:schemeClr>
+          </a:solidFill>
+        </p:spPr>
+        <p:txBody>
+          <a:bodyPr wrap="none" lIns="36000" tIns="36000" rIns="36000" bIns="36000" rtlCol="0">
+            <a:spAutoFit/>
+          </a:bodyPr>
+          <a:lstStyle/>
+          <a:p>
+            <a:pPr algn="l">
+              <a:lnSpc>
+                <a:spcPct val="100000"/>
+              </a:lnSpc>
+              <a:spcBef>
+                <a:spcPts val="600"/>
+              </a:spcBef>
+            </a:pPr>
+            <a:r>
+              <a:rPr lang="en-GB" sz="2000" dirty="0">
+                <a:solidFill>
+                  <a:schemeClr val="accent1"/>
+                </a:solidFill>
+              </a:rPr>
+              <a:t>Axle</a:t>
+            </a:r>
+          </a:p>
+        </p:txBody>
+      </p:sp>
+      <p:cxnSp>
+        <p:nvCxnSpPr>
+          <p:cNvPr id="18" name="Straight Connector 17">
+            <a:extLst>
+              <a:ext uri="{FF2B5EF4-FFF2-40B4-BE49-F238E27FC236}">
+                <a16:creationId xmlns:a16="http://schemas.microsoft.com/office/drawing/2014/main" id="{62EF49AE-B3B6-65FA-73E8-09AA7C918FC7}"/>
+              </a:ext>
+            </a:extLst>
+          </p:cNvPr>
+          <p:cNvCxnSpPr>
+            <a:cxnSpLocks/>
+            <a:stCxn id="11" idx="2"/>
+            <a:endCxn id="12" idx="0"/>
+          </p:cNvCxnSpPr>
+          <p:nvPr/>
+        </p:nvCxnSpPr>
+        <p:spPr>
+          <a:xfrm flipH="1">
+            <a:off x="7203053" y="2316995"/>
+            <a:ext cx="2768941" cy="724749"/>
           </a:xfrm>
           <a:prstGeom prst="line">
             <a:avLst/>
@@ -39626,6 +40144,454 @@
           <p:cNvPr id="2" name="Title 1">
             <a:extLst>
               <a:ext uri="{FF2B5EF4-FFF2-40B4-BE49-F238E27FC236}">
+                <a16:creationId xmlns:a16="http://schemas.microsoft.com/office/drawing/2014/main" id="{EBC08BA1-EA18-F768-5FB5-2BDEF826376F}"/>
+              </a:ext>
+            </a:extLst>
+          </p:cNvPr>
+          <p:cNvSpPr>
+            <a:spLocks noGrp="1"/>
+          </p:cNvSpPr>
+          <p:nvPr>
+            <p:ph type="title"/>
+          </p:nvPr>
+        </p:nvSpPr>
+        <p:spPr/>
+        <p:txBody>
+          <a:bodyPr/>
+          <a:lstStyle/>
+          <a:p>
+            <a:r>
+              <a:rPr lang="en-GB" dirty="0"/>
+              <a:t>Recommended procedure for new component</a:t>
+            </a:r>
+          </a:p>
+        </p:txBody>
+      </p:sp>
+      <p:sp>
+        <p:nvSpPr>
+          <p:cNvPr id="3" name="Content Placeholder 2">
+            <a:extLst>
+              <a:ext uri="{FF2B5EF4-FFF2-40B4-BE49-F238E27FC236}">
+                <a16:creationId xmlns:a16="http://schemas.microsoft.com/office/drawing/2014/main" id="{D9DCC587-4D3B-58D2-C291-2D57739FA3FE}"/>
+              </a:ext>
+            </a:extLst>
+          </p:cNvPr>
+          <p:cNvSpPr>
+            <a:spLocks noGrp="1"/>
+          </p:cNvSpPr>
+          <p:nvPr>
+            <p:ph idx="1"/>
+          </p:nvPr>
+        </p:nvSpPr>
+        <p:spPr>
+          <a:xfrm>
+            <a:off x="539748" y="1124744"/>
+            <a:ext cx="11110915" cy="5193506"/>
+          </a:xfrm>
+        </p:spPr>
+        <p:txBody>
+          <a:bodyPr/>
+          <a:lstStyle/>
+          <a:p>
+            <a:pPr marL="457200" indent="-457200">
+              <a:buFont typeface="+mj-lt"/>
+              <a:buAutoNum type="arabicPeriod"/>
+            </a:pPr>
+            <a:r>
+              <a:rPr lang="en-GB" dirty="0"/>
+              <a:t>Implement the basic model as Python class, without reference to component-model</a:t>
+            </a:r>
+          </a:p>
+          <a:p>
+            <a:pPr lvl="1"/>
+            <a:r>
+              <a:rPr lang="en-GB" dirty="0"/>
+              <a:t>Variables to be used as interface should be defined as model properties</a:t>
+            </a:r>
+          </a:p>
+          <a:p>
+            <a:pPr lvl="1"/>
+            <a:r>
+              <a:rPr lang="en-GB" dirty="0"/>
+              <a:t>A model stepping function (stepping the model from current time for one time step) is expected</a:t>
+            </a:r>
+          </a:p>
+          <a:p>
+            <a:pPr lvl="1"/>
+            <a:r>
+              <a:rPr lang="en-GB" dirty="0"/>
+              <a:t>If initialization for new simulation runs is needed, define that inside a separate function</a:t>
+            </a:r>
+          </a:p>
+          <a:p>
+            <a:pPr marL="457200" indent="-457200">
+              <a:buFont typeface="+mj-lt"/>
+              <a:buAutoNum type="arabicPeriod"/>
+            </a:pPr>
+            <a:r>
+              <a:rPr lang="en-GB" dirty="0"/>
+              <a:t>Thoroughly test the basic model, demonstrating that it works according to spec</a:t>
+            </a:r>
+          </a:p>
+          <a:p>
+            <a:pPr marL="457200" indent="-457200">
+              <a:buFont typeface="+mj-lt"/>
+              <a:buAutoNum type="arabicPeriod"/>
+            </a:pPr>
+            <a:r>
+              <a:rPr lang="en-GB" dirty="0"/>
+              <a:t>Implement the FMU packaging as separate class</a:t>
+            </a:r>
+          </a:p>
+          <a:p>
+            <a:pPr lvl="1"/>
+            <a:r>
+              <a:rPr lang="en-GB" sz="1400" dirty="0">
+                <a:latin typeface="Courier New" panose="02070309020205020404" pitchFamily="49" charset="0"/>
+                <a:cs typeface="Courier New" panose="02070309020205020404" pitchFamily="49" charset="0"/>
+              </a:rPr>
+              <a:t>class &lt;basic-model&gt;FMU(Model, &lt;basic-model&gt;) #&lt;basic-model&gt;: name of the basic model class</a:t>
+            </a:r>
+          </a:p>
+          <a:p>
+            <a:pPr lvl="1"/>
+            <a:r>
+              <a:rPr lang="en-GB" sz="1400" dirty="0">
+                <a:latin typeface="Courier New" panose="02070309020205020404" pitchFamily="49" charset="0"/>
+                <a:cs typeface="Courier New" panose="02070309020205020404" pitchFamily="49" charset="0"/>
+              </a:rPr>
+              <a:t>def __</a:t>
+            </a:r>
+            <a:r>
+              <a:rPr lang="en-GB" sz="1400" dirty="0" err="1">
+                <a:latin typeface="Courier New" panose="02070309020205020404" pitchFamily="49" charset="0"/>
+                <a:cs typeface="Courier New" panose="02070309020205020404" pitchFamily="49" charset="0"/>
+              </a:rPr>
+              <a:t>init</a:t>
+            </a:r>
+            <a:r>
+              <a:rPr lang="en-GB" sz="1400" dirty="0">
+                <a:latin typeface="Courier New" panose="02070309020205020404" pitchFamily="49" charset="0"/>
+                <a:cs typeface="Courier New" panose="02070309020205020404" pitchFamily="49" charset="0"/>
+              </a:rPr>
+              <a:t>__(self, …)</a:t>
+            </a:r>
+            <a:br>
+              <a:rPr lang="en-GB" sz="1400" dirty="0">
+                <a:latin typeface="Courier New" panose="02070309020205020404" pitchFamily="49" charset="0"/>
+                <a:cs typeface="Courier New" panose="02070309020205020404" pitchFamily="49" charset="0"/>
+              </a:rPr>
+            </a:br>
+            <a:r>
+              <a:rPr lang="en-GB" sz="1400" dirty="0">
+                <a:latin typeface="Courier New" panose="02070309020205020404" pitchFamily="49" charset="0"/>
+                <a:cs typeface="Courier New" panose="02070309020205020404" pitchFamily="49" charset="0"/>
+              </a:rPr>
+              <a:t>   Model.__</a:t>
+            </a:r>
+            <a:r>
+              <a:rPr lang="en-GB" sz="1400" dirty="0" err="1">
+                <a:latin typeface="Courier New" panose="02070309020205020404" pitchFamily="49" charset="0"/>
+                <a:cs typeface="Courier New" panose="02070309020205020404" pitchFamily="49" charset="0"/>
+              </a:rPr>
+              <a:t>init</a:t>
+            </a:r>
+            <a:r>
+              <a:rPr lang="en-GB" sz="1400" dirty="0">
+                <a:latin typeface="Courier New" panose="02070309020205020404" pitchFamily="49" charset="0"/>
+                <a:cs typeface="Courier New" panose="02070309020205020404" pitchFamily="49" charset="0"/>
+              </a:rPr>
+              <a:t>__(self, …)</a:t>
+            </a:r>
+            <a:br>
+              <a:rPr lang="en-GB" sz="1400" dirty="0">
+                <a:latin typeface="Courier New" panose="02070309020205020404" pitchFamily="49" charset="0"/>
+                <a:cs typeface="Courier New" panose="02070309020205020404" pitchFamily="49" charset="0"/>
+              </a:rPr>
+            </a:br>
+            <a:r>
+              <a:rPr lang="en-GB" sz="1400" dirty="0">
+                <a:latin typeface="Courier New" panose="02070309020205020404" pitchFamily="49" charset="0"/>
+                <a:cs typeface="Courier New" panose="02070309020205020404" pitchFamily="49" charset="0"/>
+              </a:rPr>
+              <a:t>   &lt;basic-model&gt;.__</a:t>
+            </a:r>
+            <a:r>
+              <a:rPr lang="en-GB" sz="1400" dirty="0" err="1">
+                <a:latin typeface="Courier New" panose="02070309020205020404" pitchFamily="49" charset="0"/>
+                <a:cs typeface="Courier New" panose="02070309020205020404" pitchFamily="49" charset="0"/>
+              </a:rPr>
+              <a:t>init</a:t>
+            </a:r>
+            <a:r>
+              <a:rPr lang="en-GB" sz="1400" dirty="0">
+                <a:latin typeface="Courier New" panose="02070309020205020404" pitchFamily="49" charset="0"/>
+                <a:cs typeface="Courier New" panose="02070309020205020404" pitchFamily="49" charset="0"/>
+              </a:rPr>
+              <a:t>__(self, …)</a:t>
+            </a:r>
+            <a:br>
+              <a:rPr lang="en-GB" sz="1400" dirty="0">
+                <a:latin typeface="Courier New" panose="02070309020205020404" pitchFamily="49" charset="0"/>
+                <a:cs typeface="Courier New" panose="02070309020205020404" pitchFamily="49" charset="0"/>
+              </a:rPr>
+            </a:br>
+            <a:r>
+              <a:rPr lang="en-GB" sz="1400" dirty="0">
+                <a:latin typeface="Courier New" panose="02070309020205020404" pitchFamily="49" charset="0"/>
+                <a:cs typeface="Courier New" panose="02070309020205020404" pitchFamily="49" charset="0"/>
+              </a:rPr>
+              <a:t>   _&lt;var&gt; = Variable(self, &lt;var&gt;, …) #&lt;var&gt;: variable name, same as basic-model property name</a:t>
+            </a:r>
+            <a:br>
+              <a:rPr lang="en-GB" sz="1400" dirty="0">
+                <a:latin typeface="Courier New" panose="02070309020205020404" pitchFamily="49" charset="0"/>
+                <a:cs typeface="Courier New" panose="02070309020205020404" pitchFamily="49" charset="0"/>
+              </a:rPr>
+            </a:br>
+            <a:r>
+              <a:rPr lang="en-GB" sz="1400" dirty="0">
+                <a:latin typeface="Courier New" panose="02070309020205020404" pitchFamily="49" charset="0"/>
+                <a:cs typeface="Courier New" panose="02070309020205020404" pitchFamily="49" charset="0"/>
+              </a:rPr>
+              <a:t>   …</a:t>
+            </a:r>
+          </a:p>
+          <a:p>
+            <a:pPr lvl="1"/>
+            <a:r>
+              <a:rPr lang="en-GB" sz="1400" dirty="0">
+                <a:latin typeface="Courier New" panose="02070309020205020404" pitchFamily="49" charset="0"/>
+                <a:cs typeface="Courier New" panose="02070309020205020404" pitchFamily="49" charset="0"/>
+              </a:rPr>
+              <a:t>def </a:t>
+            </a:r>
+            <a:r>
+              <a:rPr lang="en-GB" sz="1400" dirty="0" err="1">
+                <a:latin typeface="Courier New" panose="02070309020205020404" pitchFamily="49" charset="0"/>
+                <a:cs typeface="Courier New" panose="02070309020205020404" pitchFamily="49" charset="0"/>
+              </a:rPr>
+              <a:t>do_step</a:t>
+            </a:r>
+            <a:r>
+              <a:rPr lang="en-GB" sz="1400" dirty="0">
+                <a:latin typeface="Courier New" panose="02070309020205020404" pitchFamily="49" charset="0"/>
+                <a:cs typeface="Courier New" panose="02070309020205020404" pitchFamily="49" charset="0"/>
+              </a:rPr>
+              <a:t>(self, </a:t>
+            </a:r>
+            <a:r>
+              <a:rPr lang="en-GB" sz="1400" dirty="0" err="1">
+                <a:latin typeface="Courier New" panose="02070309020205020404" pitchFamily="49" charset="0"/>
+                <a:cs typeface="Courier New" panose="02070309020205020404" pitchFamily="49" charset="0"/>
+              </a:rPr>
+              <a:t>current_time</a:t>
+            </a:r>
+            <a:r>
+              <a:rPr lang="en-GB" sz="1400" dirty="0">
+                <a:latin typeface="Courier New" panose="02070309020205020404" pitchFamily="49" charset="0"/>
+                <a:cs typeface="Courier New" panose="02070309020205020404" pitchFamily="49" charset="0"/>
+              </a:rPr>
+              <a:t>: float, </a:t>
+            </a:r>
+            <a:r>
+              <a:rPr lang="en-GB" sz="1400" dirty="0" err="1">
+                <a:latin typeface="Courier New" panose="02070309020205020404" pitchFamily="49" charset="0"/>
+                <a:cs typeface="Courier New" panose="02070309020205020404" pitchFamily="49" charset="0"/>
+              </a:rPr>
+              <a:t>step_size</a:t>
+            </a:r>
+            <a:r>
+              <a:rPr lang="en-GB" sz="1400" dirty="0">
+                <a:latin typeface="Courier New" panose="02070309020205020404" pitchFamily="49" charset="0"/>
+                <a:cs typeface="Courier New" panose="02070309020205020404" pitchFamily="49" charset="0"/>
+              </a:rPr>
+              <a:t>: float): # link stepping function to FMI </a:t>
+            </a:r>
+            <a:r>
+              <a:rPr lang="en-GB" sz="1400" dirty="0" err="1">
+                <a:latin typeface="Courier New" panose="02070309020205020404" pitchFamily="49" charset="0"/>
+                <a:cs typeface="Courier New" panose="02070309020205020404" pitchFamily="49" charset="0"/>
+              </a:rPr>
+              <a:t>do_step</a:t>
+            </a:r>
+            <a:r>
+              <a:rPr lang="en-GB" sz="1400" dirty="0">
+                <a:latin typeface="Courier New" panose="02070309020205020404" pitchFamily="49" charset="0"/>
+                <a:cs typeface="Courier New" panose="02070309020205020404" pitchFamily="49" charset="0"/>
+              </a:rPr>
+              <a:t>()</a:t>
+            </a:r>
+          </a:p>
+          <a:p>
+            <a:pPr lvl="1"/>
+            <a:r>
+              <a:rPr lang="en-GB" sz="1400" dirty="0">
+                <a:latin typeface="Courier New" panose="02070309020205020404" pitchFamily="49" charset="0"/>
+                <a:cs typeface="Courier New" panose="02070309020205020404" pitchFamily="49" charset="0"/>
+              </a:rPr>
+              <a:t>def </a:t>
+            </a:r>
+            <a:r>
+              <a:rPr lang="en-GB" sz="1400" dirty="0" err="1">
+                <a:latin typeface="Courier New" panose="02070309020205020404" pitchFamily="49" charset="0"/>
+                <a:cs typeface="Courier New" panose="02070309020205020404" pitchFamily="49" charset="0"/>
+              </a:rPr>
+              <a:t>exit_initialization_mode</a:t>
+            </a:r>
+            <a:r>
+              <a:rPr lang="en-GB" sz="1400" dirty="0">
+                <a:latin typeface="Courier New" panose="02070309020205020404" pitchFamily="49" charset="0"/>
+                <a:cs typeface="Courier New" panose="02070309020205020404" pitchFamily="49" charset="0"/>
+              </a:rPr>
+              <a:t>(self): # optional: link to initialization actions</a:t>
+            </a:r>
+          </a:p>
+          <a:p>
+            <a:pPr marL="342900" indent="-342900">
+              <a:buFont typeface="+mj-lt"/>
+              <a:buAutoNum type="arabicPeriod"/>
+            </a:pPr>
+            <a:r>
+              <a:rPr lang="en-GB" dirty="0">
+                <a:cs typeface="Courier New" panose="02070309020205020404" pitchFamily="49" charset="0"/>
+              </a:rPr>
+              <a:t> Build the model </a:t>
+            </a:r>
+            <a:r>
+              <a:rPr lang="en-GB" dirty="0">
+                <a:latin typeface="Courier New" panose="02070309020205020404" pitchFamily="49" charset="0"/>
+                <a:cs typeface="Courier New" panose="02070309020205020404" pitchFamily="49" charset="0"/>
+              </a:rPr>
+              <a:t>(</a:t>
+            </a:r>
+            <a:r>
+              <a:rPr lang="en-GB" dirty="0" err="1">
+                <a:latin typeface="Courier New" panose="02070309020205020404" pitchFamily="49" charset="0"/>
+                <a:cs typeface="Courier New" panose="02070309020205020404" pitchFamily="49" charset="0"/>
+              </a:rPr>
+              <a:t>Model.build</a:t>
+            </a:r>
+            <a:r>
+              <a:rPr lang="en-GB" dirty="0">
+                <a:latin typeface="Courier New" panose="02070309020205020404" pitchFamily="49" charset="0"/>
+                <a:cs typeface="Courier New" panose="02070309020205020404" pitchFamily="49" charset="0"/>
+              </a:rPr>
+              <a:t>(…))</a:t>
+            </a:r>
+          </a:p>
+          <a:p>
+            <a:pPr marL="342900" indent="-342900">
+              <a:buFont typeface="+mj-lt"/>
+              <a:buAutoNum type="arabicPeriod"/>
+            </a:pPr>
+            <a:r>
+              <a:rPr lang="en-GB" dirty="0">
+                <a:cs typeface="Courier New" panose="02070309020205020404" pitchFamily="49" charset="0"/>
+              </a:rPr>
+              <a:t>Validate the resulting FMU (e.g. </a:t>
+            </a:r>
+            <a:r>
+              <a:rPr lang="en-GB" sz="1600" dirty="0" err="1">
+                <a:latin typeface="Courier New" panose="02070309020205020404" pitchFamily="49" charset="0"/>
+                <a:cs typeface="Courier New" panose="02070309020205020404" pitchFamily="49" charset="0"/>
+              </a:rPr>
+              <a:t>fmpy.validation.validate_fmu</a:t>
+            </a:r>
+            <a:r>
+              <a:rPr lang="en-GB" sz="1600" dirty="0">
+                <a:latin typeface="Courier New" panose="02070309020205020404" pitchFamily="49" charset="0"/>
+                <a:cs typeface="Courier New" panose="02070309020205020404" pitchFamily="49" charset="0"/>
+              </a:rPr>
+              <a:t>( &lt;</a:t>
+            </a:r>
+            <a:r>
+              <a:rPr lang="en-GB" sz="1600" dirty="0" err="1">
+                <a:latin typeface="Courier New" panose="02070309020205020404" pitchFamily="49" charset="0"/>
+                <a:cs typeface="Courier New" panose="02070309020205020404" pitchFamily="49" charset="0"/>
+              </a:rPr>
+              <a:t>fmu</a:t>
+            </a:r>
+            <a:r>
+              <a:rPr lang="en-GB" sz="1600" dirty="0">
+                <a:latin typeface="Courier New" panose="02070309020205020404" pitchFamily="49" charset="0"/>
+                <a:cs typeface="Courier New" panose="02070309020205020404" pitchFamily="49" charset="0"/>
+              </a:rPr>
+              <a:t>-file-name&gt;)</a:t>
+            </a:r>
+            <a:r>
+              <a:rPr lang="en-GB" dirty="0">
+                <a:cs typeface="Courier New" panose="02070309020205020404" pitchFamily="49" charset="0"/>
+              </a:rPr>
+              <a:t>)</a:t>
+            </a:r>
+          </a:p>
+        </p:txBody>
+      </p:sp>
+      <p:sp>
+        <p:nvSpPr>
+          <p:cNvPr id="4" name="Slide Number Placeholder 3">
+            <a:extLst>
+              <a:ext uri="{FF2B5EF4-FFF2-40B4-BE49-F238E27FC236}">
+                <a16:creationId xmlns:a16="http://schemas.microsoft.com/office/drawing/2014/main" id="{0E5EA905-2AD3-0D4D-2F97-DD578BA091C6}"/>
+              </a:ext>
+            </a:extLst>
+          </p:cNvPr>
+          <p:cNvSpPr>
+            <a:spLocks noGrp="1"/>
+          </p:cNvSpPr>
+          <p:nvPr>
+            <p:ph type="sldNum" sz="quarter" idx="12"/>
+          </p:nvPr>
+        </p:nvSpPr>
+        <p:spPr/>
+        <p:txBody>
+          <a:bodyPr/>
+          <a:lstStyle/>
+          <a:p>
+            <a:fld id="{5BA07366-CB75-4AA8-9E5B-928B849F427C}" type="slidenum">
+              <a:rPr lang="en-GB" smtClean="0"/>
+              <a:t>3</a:t>
+            </a:fld>
+            <a:endParaRPr lang="en-GB" dirty="0"/>
+          </a:p>
+        </p:txBody>
+      </p:sp>
+    </p:spTree>
+    <p:extLst>
+      <p:ext uri="{BB962C8B-B14F-4D97-AF65-F5344CB8AC3E}">
+        <p14:creationId xmlns:p14="http://schemas.microsoft.com/office/powerpoint/2010/main" val="890548097"/>
+      </p:ext>
+    </p:extLst>
+  </p:cSld>
+  <p:clrMapOvr>
+    <a:masterClrMapping/>
+  </p:clrMapOvr>
+</p:sld>
+</file>
+
+<file path=ppt/slides/slide4.xml><?xml version="1.0" encoding="utf-8"?>
+<p:sld xmlns:a="http://schemas.openxmlformats.org/drawingml/2006/main" xmlns:r="http://schemas.openxmlformats.org/officeDocument/2006/relationships" xmlns:p="http://schemas.openxmlformats.org/presentationml/2006/main">
+  <p:cSld>
+    <p:spTree>
+      <p:nvGrpSpPr>
+        <p:cNvPr id="1" name=""/>
+        <p:cNvGrpSpPr/>
+        <p:nvPr/>
+      </p:nvGrpSpPr>
+      <p:grpSpPr>
+        <a:xfrm>
+          <a:off x="0" y="0"/>
+          <a:ext cx="0" cy="0"/>
+          <a:chOff x="0" y="0"/>
+          <a:chExt cx="0" cy="0"/>
+        </a:xfrm>
+      </p:grpSpPr>
+      <p:sp>
+        <p:nvSpPr>
+          <p:cNvPr id="2" name="Title 1">
+            <a:extLst>
+              <a:ext uri="{FF2B5EF4-FFF2-40B4-BE49-F238E27FC236}">
                 <a16:creationId xmlns:a16="http://schemas.microsoft.com/office/drawing/2014/main" id="{207448A9-DEDE-4D66-C265-10E3F9F4A7E4}"/>
               </a:ext>
             </a:extLst>
@@ -39731,7 +40697,14 @@
             </a:r>
             <a:r>
               <a:rPr lang="en-GB" dirty="0"/>
-              <a:t> vectors  </a:t>
+              <a:t> vectors</a:t>
+            </a:r>
+          </a:p>
+          <a:p>
+            <a:pPr lvl="1"/>
+            <a:r>
+              <a:rPr lang="en-GB" dirty="0"/>
+              <a:t>input derivatives (e.g. acceleration with respect to speed) defined as virtual interface variable  </a:t>
             </a:r>
           </a:p>
           <a:p>
@@ -39763,7 +40736,7 @@
           <a:p>
             <a:fld id="{5BA07366-CB75-4AA8-9E5B-928B849F427C}" type="slidenum">
               <a:rPr lang="en-GB" smtClean="0"/>
-              <a:t>3</a:t>
+              <a:t>4</a:t>
             </a:fld>
             <a:endParaRPr lang="en-GB" dirty="0"/>
           </a:p>
@@ -39782,7 +40755,7 @@
 </p:sld>
 </file>
 
-<file path=ppt/slides/slide4.xml><?xml version="1.0" encoding="utf-8"?>
+<file path=ppt/slides/slide5.xml><?xml version="1.0" encoding="utf-8"?>
 <p:sld xmlns:a="http://schemas.openxmlformats.org/drawingml/2006/main" xmlns:r="http://schemas.openxmlformats.org/officeDocument/2006/relationships" xmlns:p="http://schemas.openxmlformats.org/presentationml/2006/main">
   <p:cSld>
     <p:spTree>
@@ -40015,7 +40988,7 @@
           <a:p>
             <a:fld id="{5BA07366-CB75-4AA8-9E5B-928B849F427C}" type="slidenum">
               <a:rPr lang="en-GB" smtClean="0"/>
-              <a:t>4</a:t>
+              <a:t>5</a:t>
             </a:fld>
             <a:endParaRPr lang="en-GB" dirty="0"/>
           </a:p>
@@ -40457,7 +41430,7 @@
 </p:sld>
 </file>
 
-<file path=ppt/slides/slide5.xml><?xml version="1.0" encoding="utf-8"?>
+<file path=ppt/slides/slide6.xml><?xml version="1.0" encoding="utf-8"?>
 <p:sld xmlns:a="http://schemas.openxmlformats.org/drawingml/2006/main" xmlns:r="http://schemas.openxmlformats.org/officeDocument/2006/relationships" xmlns:p="http://schemas.openxmlformats.org/presentationml/2006/main">
   <p:cSld>
     <p:spTree>
@@ -40530,7 +41503,7 @@
           <a:p>
             <a:fld id="{5BA07366-CB75-4AA8-9E5B-928B849F427C}" type="slidenum">
               <a:rPr lang="en-GB" smtClean="0"/>
-              <a:t>5</a:t>
+              <a:t>6</a:t>
             </a:fld>
             <a:endParaRPr lang="en-GB" dirty="0"/>
           </a:p>
@@ -40551,7 +41524,7 @@
           <p:nvPr/>
         </p:nvPicPr>
         <p:blipFill>
-          <a:blip r:embed="rId2"/>
+          <a:blip r:embed="rId3"/>
           <a:stretch>
             <a:fillRect/>
           </a:stretch>
@@ -41200,7 +42173,7 @@
 </p:sld>
 </file>
 
-<file path=ppt/slides/slide6.xml><?xml version="1.0" encoding="utf-8"?>
+<file path=ppt/slides/slide7.xml><?xml version="1.0" encoding="utf-8"?>
 <p:sld xmlns:a="http://schemas.openxmlformats.org/drawingml/2006/main" xmlns:r="http://schemas.openxmlformats.org/officeDocument/2006/relationships" xmlns:p="http://schemas.openxmlformats.org/presentationml/2006/main">
   <p:cSld>
     <p:spTree>
@@ -41795,7 +42768,7 @@
           <a:p>
             <a:fld id="{5BA07366-CB75-4AA8-9E5B-928B849F427C}" type="slidenum">
               <a:rPr lang="en-GB" smtClean="0"/>
-              <a:t>6</a:t>
+              <a:t>7</a:t>
             </a:fld>
             <a:endParaRPr lang="en-GB" dirty="0"/>
           </a:p>
@@ -41814,7 +42787,7 @@
 </p:sld>
 </file>
 
-<file path=ppt/slides/slide7.xml><?xml version="1.0" encoding="utf-8"?>
+<file path=ppt/slides/slide8.xml><?xml version="1.0" encoding="utf-8"?>
 <p:sld xmlns:a="http://schemas.openxmlformats.org/drawingml/2006/main" xmlns:r="http://schemas.openxmlformats.org/officeDocument/2006/relationships" xmlns:p="http://schemas.openxmlformats.org/presentationml/2006/main">
   <p:cSld>
     <p:spTree>
@@ -41927,7 +42900,7 @@
             <a:fld id="{5BA07366-CB75-4AA8-9E5B-928B849F427C}" type="slidenum">
               <a:rPr lang="en-GB" smtClean="0"/>
               <a:pPr/>
-              <a:t>7</a:t>
+              <a:t>8</a:t>
             </a:fld>
             <a:endParaRPr lang="en-GB" dirty="0"/>
           </a:p>

</xml_diff>